<commit_message>
Worked on Materials for modeling section
</commit_message>
<xml_diff>
--- a/Slides/IntroductionToRForBeginners_DayII_MT.pptx
+++ b/Slides/IntroductionToRForBeginners_DayII_MT.pptx
@@ -473,7 +473,7 @@
           <a:p>
             <a:fld id="{5A7C8C98-4CB3-174D-B081-3039D0753C62}" type="datetimeFigureOut">
               <a:rPr lang="en-US" smtClean="0"/>
-              <a:t>5/5/2022</a:t>
+              <a:t>5/6/2022</a:t>
             </a:fld>
             <a:endParaRPr lang="en-US" dirty="0"/>
           </a:p>
@@ -962,7 +962,7 @@
             <a:fld id="{32338A89-9E82-4046-8247-794AEC633712}" type="datetimeFigureOut">
               <a:rPr lang="en-US" smtClean="0"/>
               <a:pPr/>
-              <a:t>5/5/2022</a:t>
+              <a:t>5/6/2022</a:t>
             </a:fld>
             <a:endParaRPr lang="en-US" dirty="0"/>
           </a:p>
@@ -1348,7 +1348,7 @@
           <a:p>
             <a:fld id="{32338A89-9E82-4046-8247-794AEC633712}" type="datetimeFigureOut">
               <a:rPr lang="en-US" smtClean="0"/>
-              <a:t>5/5/2022</a:t>
+              <a:t>5/6/2022</a:t>
             </a:fld>
             <a:endParaRPr lang="en-US" dirty="0"/>
           </a:p>
@@ -1998,7 +1998,7 @@
           <a:p>
             <a:fld id="{32338A89-9E82-4046-8247-794AEC633712}" type="datetimeFigureOut">
               <a:rPr lang="en-US" smtClean="0"/>
-              <a:t>5/5/2022</a:t>
+              <a:t>5/6/2022</a:t>
             </a:fld>
             <a:endParaRPr lang="en-US" dirty="0"/>
           </a:p>
@@ -2572,7 +2572,7 @@
           <a:p>
             <a:fld id="{32338A89-9E82-4046-8247-794AEC633712}" type="datetimeFigureOut">
               <a:rPr lang="en-US" smtClean="0"/>
-              <a:t>5/5/2022</a:t>
+              <a:t>5/6/2022</a:t>
             </a:fld>
             <a:endParaRPr lang="en-US" dirty="0"/>
           </a:p>
@@ -2798,7 +2798,7 @@
           <a:p>
             <a:fld id="{32338A89-9E82-4046-8247-794AEC633712}" type="datetimeFigureOut">
               <a:rPr lang="en-US" smtClean="0"/>
-              <a:t>5/5/2022</a:t>
+              <a:t>5/6/2022</a:t>
             </a:fld>
             <a:endParaRPr lang="en-US" dirty="0"/>
           </a:p>
@@ -3096,7 +3096,7 @@
             <a:fld id="{32338A89-9E82-4046-8247-794AEC633712}" type="datetimeFigureOut">
               <a:rPr lang="en-US" smtClean="0"/>
               <a:pPr/>
-              <a:t>5/5/2022</a:t>
+              <a:t>5/6/2022</a:t>
             </a:fld>
             <a:endParaRPr lang="en-US" dirty="0"/>
           </a:p>
@@ -3692,6 +3692,13 @@
   <p:clrMapOvr>
     <a:masterClrMapping/>
   </p:clrMapOvr>
+  <p:timing>
+    <p:tnLst>
+      <p:par>
+        <p:cTn id="1" dur="indefinite" restart="never" nodeType="tmRoot"/>
+      </p:par>
+    </p:tnLst>
+  </p:timing>
 </p:sld>
 </file>
 
@@ -4103,6 +4110,13 @@
   <p:clrMapOvr>
     <a:masterClrMapping/>
   </p:clrMapOvr>
+  <p:timing>
+    <p:tnLst>
+      <p:par>
+        <p:cTn id="1" dur="indefinite" restart="never" nodeType="tmRoot"/>
+      </p:par>
+    </p:tnLst>
+  </p:timing>
 </p:sld>
 </file>
 
@@ -7063,6 +7077,13 @@
   <p:clrMapOvr>
     <a:masterClrMapping/>
   </p:clrMapOvr>
+  <p:timing>
+    <p:tnLst>
+      <p:par>
+        <p:cTn id="1" dur="indefinite" restart="never" nodeType="tmRoot"/>
+      </p:par>
+    </p:tnLst>
+  </p:timing>
 </p:sld>
 </file>
 
@@ -8619,6 +8640,13 @@
   <p:clrMapOvr>
     <a:masterClrMapping/>
   </p:clrMapOvr>
+  <p:timing>
+    <p:tnLst>
+      <p:par>
+        <p:cTn id="1" dur="indefinite" restart="never" nodeType="tmRoot"/>
+      </p:par>
+    </p:tnLst>
+  </p:timing>
 </p:sld>
 </file>
 
@@ -10227,6 +10255,13 @@
   <p:clrMapOvr>
     <a:masterClrMapping/>
   </p:clrMapOvr>
+  <p:timing>
+    <p:tnLst>
+      <p:par>
+        <p:cTn id="1" dur="indefinite" restart="never" nodeType="tmRoot"/>
+      </p:par>
+    </p:tnLst>
+  </p:timing>
 </p:sld>
 </file>
 
@@ -11343,6 +11378,13 @@
   <p:clrMapOvr>
     <a:masterClrMapping/>
   </p:clrMapOvr>
+  <p:timing>
+    <p:tnLst>
+      <p:par>
+        <p:cTn id="1" dur="indefinite" restart="never" nodeType="tmRoot"/>
+      </p:par>
+    </p:tnLst>
+  </p:timing>
 </p:sld>
 </file>
 
@@ -11756,6 +11798,13 @@
   <p:clrMapOvr>
     <a:masterClrMapping/>
   </p:clrMapOvr>
+  <p:timing>
+    <p:tnLst>
+      <p:par>
+        <p:cTn id="1" dur="indefinite" restart="never" nodeType="tmRoot"/>
+      </p:par>
+    </p:tnLst>
+  </p:timing>
 </p:sld>
 </file>
 
@@ -12033,6 +12082,13 @@
   <p:clrMapOvr>
     <a:masterClrMapping/>
   </p:clrMapOvr>
+  <p:timing>
+    <p:tnLst>
+      <p:par>
+        <p:cTn id="1" dur="indefinite" restart="never" nodeType="tmRoot"/>
+      </p:par>
+    </p:tnLst>
+  </p:timing>
 </p:sld>
 </file>
 
@@ -13765,6 +13821,13 @@
   <p:clrMapOvr>
     <a:masterClrMapping/>
   </p:clrMapOvr>
+  <p:timing>
+    <p:tnLst>
+      <p:par>
+        <p:cTn id="1" dur="indefinite" restart="never" nodeType="tmRoot"/>
+      </p:par>
+    </p:tnLst>
+  </p:timing>
 </p:sld>
 </file>
 
@@ -16104,6 +16167,13 @@
   <p:clrMapOvr>
     <a:masterClrMapping/>
   </p:clrMapOvr>
+  <p:timing>
+    <p:tnLst>
+      <p:par>
+        <p:cTn id="1" dur="indefinite" restart="never" nodeType="tmRoot"/>
+      </p:par>
+    </p:tnLst>
+  </p:timing>
 </p:sld>
 </file>
 
@@ -17968,6 +18038,13 @@
   <p:clrMapOvr>
     <a:masterClrMapping/>
   </p:clrMapOvr>
+  <p:timing>
+    <p:tnLst>
+      <p:par>
+        <p:cTn id="1" dur="indefinite" restart="never" nodeType="tmRoot"/>
+      </p:par>
+    </p:tnLst>
+  </p:timing>
 </p:sld>
 </file>
 
@@ -18035,6 +18112,13 @@
   <p:clrMapOvr>
     <a:masterClrMapping/>
   </p:clrMapOvr>
+  <p:timing>
+    <p:tnLst>
+      <p:par>
+        <p:cTn id="1" dur="indefinite" restart="never" nodeType="tmRoot"/>
+      </p:par>
+    </p:tnLst>
+  </p:timing>
 </p:sld>
 </file>
 
@@ -19995,14 +20079,7 @@
                 <a:latin typeface="Times New Roman" panose="02020603050405020304" pitchFamily="18" charset="0"/>
                 <a:cs typeface="Times New Roman" panose="02020603050405020304" pitchFamily="18" charset="0"/>
               </a:rPr>
-              <a:t>This will fix the estimate of Sepal Width’s effect in the model at 1.3 (recall from earlier that 1.27703 wa</a:t>
-            </a:r>
-            <a:r>
-              <a:rPr lang="en-US" sz="1600" dirty="0" smtClean="0">
-                <a:latin typeface="Times New Roman" panose="02020603050405020304" pitchFamily="18" charset="0"/>
-                <a:cs typeface="Times New Roman" panose="02020603050405020304" pitchFamily="18" charset="0"/>
-              </a:rPr>
-              <a:t>s the </a:t>
+              <a:t>This will fix the estimate of Sepal Width’s effect in the model at 1.3 (recall from earlier that 1.27703 was the </a:t>
             </a:r>
             <a:r>
               <a:rPr lang="en-US" sz="1600" dirty="0" err="1" smtClean="0">
@@ -20166,6 +20243,13 @@
   <p:clrMapOvr>
     <a:masterClrMapping/>
   </p:clrMapOvr>
+  <p:timing>
+    <p:tnLst>
+      <p:par>
+        <p:cTn id="1" dur="indefinite" restart="never" nodeType="tmRoot"/>
+      </p:par>
+    </p:tnLst>
+  </p:timing>
 </p:sld>
 </file>
 
@@ -22132,6 +22216,13 @@
   <p:clrMapOvr>
     <a:masterClrMapping/>
   </p:clrMapOvr>
+  <p:timing>
+    <p:tnLst>
+      <p:par>
+        <p:cTn id="1" dur="indefinite" restart="never" nodeType="tmRoot"/>
+      </p:par>
+    </p:tnLst>
+  </p:timing>
 </p:sld>
 </file>
 
@@ -22428,8 +22519,8 @@
         </p:nvSpPr>
         <p:spPr>
           <a:xfrm>
-            <a:off x="180041" y="5235178"/>
-            <a:ext cx="10120406" cy="523220"/>
+            <a:off x="202045" y="5250252"/>
+            <a:ext cx="11823700" cy="523220"/>
           </a:xfrm>
           <a:prstGeom prst="rect">
             <a:avLst/>
@@ -22494,8 +22585,26 @@
                 <a:latin typeface="Courier New" panose="02070309020205020404" pitchFamily="49" charset="0"/>
                 <a:cs typeface="Courier New" panose="02070309020205020404" pitchFamily="49" charset="0"/>
               </a:rPr>
-              <a:t> + Species);</a:t>
-            </a:r>
+              <a:t> + </a:t>
+            </a:r>
+            <a:r>
+              <a:rPr lang="en-US" sz="1400" b="1" dirty="0" err="1" smtClean="0">
+                <a:latin typeface="Courier New" panose="02070309020205020404" pitchFamily="49" charset="0"/>
+                <a:cs typeface="Courier New" panose="02070309020205020404" pitchFamily="49" charset="0"/>
+              </a:rPr>
+              <a:t>as.factor</a:t>
+            </a:r>
+            <a:r>
+              <a:rPr lang="en-US" sz="1400" b="1" dirty="0" smtClean="0">
+                <a:latin typeface="Courier New" panose="02070309020205020404" pitchFamily="49" charset="0"/>
+                <a:cs typeface="Courier New" panose="02070309020205020404" pitchFamily="49" charset="0"/>
+              </a:rPr>
+              <a:t>(Species));</a:t>
+            </a:r>
+            <a:endParaRPr lang="en-US" sz="1400" b="1" dirty="0" smtClean="0">
+              <a:latin typeface="Courier New" panose="02070309020205020404" pitchFamily="49" charset="0"/>
+              <a:cs typeface="Courier New" panose="02070309020205020404" pitchFamily="49" charset="0"/>
+            </a:endParaRPr>
           </a:p>
           <a:p>
             <a:r>
@@ -22532,6 +22641,13 @@
   <p:clrMapOvr>
     <a:masterClrMapping/>
   </p:clrMapOvr>
+  <p:timing>
+    <p:tnLst>
+      <p:par>
+        <p:cTn id="1" dur="indefinite" restart="never" nodeType="tmRoot"/>
+      </p:par>
+    </p:tnLst>
+  </p:timing>
 </p:sld>
 </file>
 
@@ -22865,6 +22981,13 @@
   <p:clrMapOvr>
     <a:masterClrMapping/>
   </p:clrMapOvr>
+  <p:timing>
+    <p:tnLst>
+      <p:par>
+        <p:cTn id="1" dur="indefinite" restart="never" nodeType="tmRoot"/>
+      </p:par>
+    </p:tnLst>
+  </p:timing>
 </p:sld>
 </file>
 
@@ -23129,6 +23252,13 @@
   <p:clrMapOvr>
     <a:masterClrMapping/>
   </p:clrMapOvr>
+  <p:timing>
+    <p:tnLst>
+      <p:par>
+        <p:cTn id="1" dur="indefinite" restart="never" nodeType="tmRoot"/>
+      </p:par>
+    </p:tnLst>
+  </p:timing>
 </p:sld>
 </file>
 
@@ -23488,6 +23618,13 @@
   <p:clrMapOvr>
     <a:masterClrMapping/>
   </p:clrMapOvr>
+  <p:timing>
+    <p:tnLst>
+      <p:par>
+        <p:cTn id="1" dur="indefinite" restart="never" nodeType="tmRoot"/>
+      </p:par>
+    </p:tnLst>
+  </p:timing>
 </p:sld>
 </file>
 
@@ -23508,6 +23645,30 @@
           <a:chExt cx="0" cy="0"/>
         </a:xfrm>
       </p:grpSpPr>
+      <p:pic>
+        <p:nvPicPr>
+          <p:cNvPr id="16" name="Picture 15"/>
+          <p:cNvPicPr>
+            <a:picLocks noChangeAspect="1"/>
+          </p:cNvPicPr>
+          <p:nvPr/>
+        </p:nvPicPr>
+        <p:blipFill>
+          <a:blip r:embed="rId2"/>
+          <a:stretch>
+            <a:fillRect/>
+          </a:stretch>
+        </p:blipFill>
+        <p:spPr>
+          <a:xfrm>
+            <a:off x="6056118" y="4357006"/>
+            <a:ext cx="6191250" cy="1410989"/>
+          </a:xfrm>
+          <a:prstGeom prst="rect">
+            <a:avLst/>
+          </a:prstGeom>
+        </p:spPr>
+      </p:pic>
       <p:sp>
         <p:nvSpPr>
           <p:cNvPr id="2" name="Rectangle 1"/>
@@ -23516,8 +23677,8 @@
         </p:nvSpPr>
         <p:spPr>
           <a:xfrm>
-            <a:off x="5139654" y="5253417"/>
-            <a:ext cx="7052346" cy="369332"/>
+            <a:off x="0" y="5767995"/>
+            <a:ext cx="7052346" cy="276999"/>
           </a:xfrm>
           <a:prstGeom prst="rect">
             <a:avLst/>
@@ -23530,31 +23691,31 @@
           <a:lstStyle/>
           <a:p>
             <a:r>
-              <a:rPr lang="en-US" dirty="0">
-                <a:hlinkClick r:id="rId2"/>
+              <a:rPr lang="en-US" sz="1200" dirty="0">
+                <a:hlinkClick r:id="rId3"/>
               </a:rPr>
               <a:t>https://blogs.uoregon.edu/rclub/2015/11/03/anova-contrasts-in-r</a:t>
             </a:r>
             <a:r>
-              <a:rPr lang="en-US" dirty="0" smtClean="0">
-                <a:hlinkClick r:id="rId2"/>
+              <a:rPr lang="en-US" sz="1200" dirty="0" smtClean="0">
+                <a:hlinkClick r:id="rId3"/>
               </a:rPr>
               <a:t>/</a:t>
             </a:r>
-            <a:endParaRPr lang="en-US" dirty="0" smtClean="0"/>
+            <a:endParaRPr lang="en-US" sz="1200" dirty="0" smtClean="0"/>
           </a:p>
         </p:txBody>
       </p:sp>
       <p:sp>
         <p:nvSpPr>
-          <p:cNvPr id="3" name="TextBox 2"/>
+          <p:cNvPr id="4" name="TextBox 3"/>
           <p:cNvSpPr txBox="1"/>
           <p:nvPr/>
         </p:nvSpPr>
         <p:spPr>
           <a:xfrm>
-            <a:off x="838899" y="578840"/>
-            <a:ext cx="10519795" cy="369332"/>
+            <a:off x="0" y="6015783"/>
+            <a:ext cx="9571838" cy="461665"/>
           </a:xfrm>
           <a:prstGeom prst="rect">
             <a:avLst/>
@@ -23568,20 +23729,687 @@
           <a:lstStyle/>
           <a:p>
             <a:r>
+              <a:rPr lang="en-US" sz="1200" dirty="0">
+                <a:hlinkClick r:id="rId4"/>
+              </a:rPr>
+              <a:t>https://</a:t>
+            </a:r>
+            <a:r>
+              <a:rPr lang="en-US" sz="1200" dirty="0" smtClean="0">
+                <a:hlinkClick r:id="rId4"/>
+              </a:rPr>
+              <a:t>stackoverflow.com/questions/57297771/interpretation-of-l-q-c-4-for-logistic-regression</a:t>
+            </a:r>
+            <a:endParaRPr lang="en-US" sz="1200" dirty="0" smtClean="0"/>
+          </a:p>
+          <a:p>
+            <a:endParaRPr lang="en-US" sz="1200" dirty="0"/>
+          </a:p>
+        </p:txBody>
+      </p:sp>
+      <p:sp>
+        <p:nvSpPr>
+          <p:cNvPr id="5" name="Rectangle 4"/>
+          <p:cNvSpPr/>
+          <p:nvPr/>
+        </p:nvSpPr>
+        <p:spPr>
+          <a:xfrm>
+            <a:off x="0" y="6236501"/>
+            <a:ext cx="9550400" cy="461665"/>
+          </a:xfrm>
+          <a:prstGeom prst="rect">
+            <a:avLst/>
+          </a:prstGeom>
+        </p:spPr>
+        <p:txBody>
+          <a:bodyPr wrap="square">
+            <a:spAutoFit/>
+          </a:bodyPr>
+          <a:lstStyle/>
+          <a:p>
+            <a:r>
+              <a:rPr lang="en-US" sz="1200" dirty="0">
+                <a:hlinkClick r:id="rId5"/>
+              </a:rPr>
+              <a:t>https://</a:t>
+            </a:r>
+            <a:r>
+              <a:rPr lang="en-US" sz="1200" dirty="0" smtClean="0">
+                <a:hlinkClick r:id="rId5"/>
+              </a:rPr>
+              <a:t>github.com/RInterested/SIMULATIONS_and_PROOFS/blob/master/Contrasts%20Polynomial</a:t>
+            </a:r>
+            <a:endParaRPr lang="en-US" sz="1200" dirty="0" smtClean="0"/>
+          </a:p>
+          <a:p>
+            <a:endParaRPr lang="en-US" sz="1200" dirty="0" smtClean="0"/>
+          </a:p>
+        </p:txBody>
+      </p:sp>
+      <p:sp>
+        <p:nvSpPr>
+          <p:cNvPr id="6" name="Rectangle 5"/>
+          <p:cNvSpPr/>
+          <p:nvPr/>
+        </p:nvSpPr>
+        <p:spPr>
+          <a:xfrm>
+            <a:off x="0" y="6467334"/>
+            <a:ext cx="9426429" cy="461665"/>
+          </a:xfrm>
+          <a:prstGeom prst="rect">
+            <a:avLst/>
+          </a:prstGeom>
+        </p:spPr>
+        <p:txBody>
+          <a:bodyPr wrap="square">
+            <a:spAutoFit/>
+          </a:bodyPr>
+          <a:lstStyle/>
+          <a:p>
+            <a:r>
+              <a:rPr lang="en-US" sz="1200" dirty="0">
+                <a:hlinkClick r:id="rId6"/>
+              </a:rPr>
+              <a:t>https://</a:t>
+            </a:r>
+            <a:r>
+              <a:rPr lang="en-US" sz="1200" dirty="0" smtClean="0">
+                <a:hlinkClick r:id="rId6"/>
+              </a:rPr>
+              <a:t>stats.stackexchange.com/questions/105115/polynomial-contrasts-for-regression</a:t>
+            </a:r>
+            <a:endParaRPr lang="en-US" sz="1200" dirty="0" smtClean="0"/>
+          </a:p>
+          <a:p>
+            <a:endParaRPr lang="en-US" sz="1200" dirty="0" smtClean="0"/>
+          </a:p>
+        </p:txBody>
+      </p:sp>
+      <p:sp>
+        <p:nvSpPr>
+          <p:cNvPr id="7" name="TextBox 6"/>
+          <p:cNvSpPr txBox="1"/>
+          <p:nvPr/>
+        </p:nvSpPr>
+        <p:spPr>
+          <a:xfrm>
+            <a:off x="0" y="5476682"/>
+            <a:ext cx="6130637" cy="369332"/>
+          </a:xfrm>
+          <a:prstGeom prst="rect">
+            <a:avLst/>
+          </a:prstGeom>
+          <a:noFill/>
+        </p:spPr>
+        <p:txBody>
+          <a:bodyPr wrap="square" rtlCol="0">
+            <a:spAutoFit/>
+          </a:bodyPr>
+          <a:lstStyle/>
+          <a:p>
+            <a:r>
+              <a:rPr lang="en-US" b="1" u="sng" dirty="0" smtClean="0"/>
+              <a:t>For more information on the ordinal contrast beta estimates.</a:t>
+            </a:r>
+            <a:endParaRPr lang="en-US" b="1" u="sng" dirty="0"/>
+          </a:p>
+        </p:txBody>
+      </p:sp>
+      <p:sp>
+        <p:nvSpPr>
+          <p:cNvPr id="8" name="Title 1">
+            <a:extLst>
+              <a:ext uri="{FF2B5EF4-FFF2-40B4-BE49-F238E27FC236}">
+                <a16:creationId xmlns:a16="http://schemas.microsoft.com/office/drawing/2014/main" id="{636FB483-8A01-854E-9BBE-55E0C355A79B}"/>
+              </a:ext>
+            </a:extLst>
+          </p:cNvPr>
+          <p:cNvSpPr txBox="1">
+            <a:spLocks/>
+          </p:cNvSpPr>
+          <p:nvPr/>
+        </p:nvSpPr>
+        <p:spPr>
+          <a:xfrm>
+            <a:off x="292557" y="283221"/>
+            <a:ext cx="11316737" cy="656493"/>
+          </a:xfrm>
+          <a:prstGeom prst="rect">
+            <a:avLst/>
+          </a:prstGeom>
+        </p:spPr>
+        <p:txBody>
+          <a:bodyPr/>
+          <a:lstStyle>
+            <a:lvl1pPr algn="l" defTabSz="914400" rtl="0" eaLnBrk="1" latinLnBrk="0" hangingPunct="1">
+              <a:lnSpc>
+                <a:spcPct val="90000"/>
+              </a:lnSpc>
+              <a:spcBef>
+                <a:spcPct val="0"/>
+              </a:spcBef>
+              <a:buNone/>
+              <a:defRPr sz="2800" b="1" kern="1200">
+                <a:solidFill>
+                  <a:schemeClr val="tx1"/>
+                </a:solidFill>
+                <a:latin typeface="Helvetica" pitchFamily="2" charset="0"/>
+                <a:ea typeface="+mj-ea"/>
+                <a:cs typeface="+mj-cs"/>
+              </a:defRPr>
+            </a:lvl1pPr>
+          </a:lstStyle>
+          <a:p>
+            <a:r>
+              <a:rPr lang="en-US" dirty="0" smtClean="0">
+                <a:latin typeface="Times New Roman" panose="02020603050405020304" pitchFamily="18" charset="0"/>
+                <a:cs typeface="Times New Roman" panose="02020603050405020304" pitchFamily="18" charset="0"/>
+              </a:rPr>
+              <a:t>Adding Ordinal Effects in an R Model (Iris </a:t>
+            </a:r>
+            <a:r>
+              <a:rPr lang="en-US" dirty="0" smtClean="0">
+                <a:latin typeface="Times New Roman" panose="02020603050405020304" pitchFamily="18" charset="0"/>
+                <a:cs typeface="Times New Roman" panose="02020603050405020304" pitchFamily="18" charset="0"/>
+              </a:rPr>
+              <a:t>Data)</a:t>
+            </a:r>
+            <a:endParaRPr lang="en-US" dirty="0">
+              <a:latin typeface="Times New Roman" panose="02020603050405020304" pitchFamily="18" charset="0"/>
+              <a:cs typeface="Times New Roman" panose="02020603050405020304" pitchFamily="18" charset="0"/>
+            </a:endParaRPr>
+          </a:p>
+        </p:txBody>
+      </p:sp>
+      <p:sp>
+        <p:nvSpPr>
+          <p:cNvPr id="9" name="TextBox 8"/>
+          <p:cNvSpPr txBox="1"/>
+          <p:nvPr/>
+        </p:nvSpPr>
+        <p:spPr>
+          <a:xfrm>
+            <a:off x="301336" y="939714"/>
+            <a:ext cx="11388437" cy="1200329"/>
+          </a:xfrm>
+          <a:prstGeom prst="rect">
+            <a:avLst/>
+          </a:prstGeom>
+          <a:noFill/>
+        </p:spPr>
+        <p:txBody>
+          <a:bodyPr wrap="square" rtlCol="0">
+            <a:spAutoFit/>
+          </a:bodyPr>
+          <a:lstStyle/>
+          <a:p>
+            <a:pPr marL="285750" indent="-285750">
+              <a:buFont typeface="Arial" panose="020B0604020202020204" pitchFamily="34" charset="0"/>
+              <a:buChar char="•"/>
+            </a:pPr>
+            <a:r>
+              <a:rPr lang="en-US" dirty="0" smtClean="0"/>
+              <a:t>Just as we used the ‘</a:t>
+            </a:r>
+            <a:r>
               <a:rPr lang="en-US" dirty="0" err="1" smtClean="0"/>
-              <a:t>Anova</a:t>
+              <a:t>as.factor</a:t>
             </a:r>
             <a:r>
               <a:rPr lang="en-US" dirty="0" smtClean="0"/>
-              <a:t> and </a:t>
-            </a:r>
-            <a:r>
-              <a:rPr lang="en-US" dirty="0" err="1" smtClean="0"/>
-              <a:t>aov</a:t>
-            </a:r>
+              <a:t>()’ function in the formula for the categorical variables which were unordered, we may use the ‘ordered()’ function for those which are ordered. </a:t>
+            </a:r>
+          </a:p>
+          <a:p>
+            <a:pPr marL="285750" indent="-285750">
+              <a:buFont typeface="Arial" panose="020B0604020202020204" pitchFamily="34" charset="0"/>
+              <a:buChar char="•"/>
+            </a:pPr>
             <a:r>
               <a:rPr lang="en-US" dirty="0" smtClean="0"/>
-              <a:t> and contrasts in R, and adding ordinal statistics.</a:t>
+              <a:t>First let us create an ordinal variable in the iris dataset based on the value of petal-width.  Let us create three equally sized groups with small, medium and large petal sizes.  In R we can easily do this using the ‘cut()’ function.</a:t>
+            </a:r>
+          </a:p>
+        </p:txBody>
+      </p:sp>
+      <p:sp>
+        <p:nvSpPr>
+          <p:cNvPr id="13" name="TextBox 12"/>
+          <p:cNvSpPr txBox="1"/>
+          <p:nvPr/>
+        </p:nvSpPr>
+        <p:spPr>
+          <a:xfrm>
+            <a:off x="3473960" y="2283234"/>
+            <a:ext cx="4360786" cy="307777"/>
+          </a:xfrm>
+          <a:prstGeom prst="rect">
+            <a:avLst/>
+          </a:prstGeom>
+          <a:noFill/>
+          <a:ln>
+            <a:solidFill>
+              <a:schemeClr val="tx1"/>
+            </a:solidFill>
+          </a:ln>
+        </p:spPr>
+        <p:txBody>
+          <a:bodyPr wrap="square" rtlCol="0">
+            <a:spAutoFit/>
+          </a:bodyPr>
+          <a:lstStyle/>
+          <a:p>
+            <a:r>
+              <a:rPr lang="en-US" sz="1400" b="1" dirty="0" smtClean="0">
+                <a:latin typeface="Courier New" panose="02070309020205020404" pitchFamily="49" charset="0"/>
+                <a:cs typeface="Courier New" panose="02070309020205020404" pitchFamily="49" charset="0"/>
+              </a:rPr>
+              <a:t>R</a:t>
+            </a:r>
+            <a:r>
+              <a:rPr lang="en-US" sz="1400" b="1" dirty="0" smtClean="0">
+                <a:latin typeface="Courier New" panose="02070309020205020404" pitchFamily="49" charset="0"/>
+                <a:cs typeface="Courier New" panose="02070309020205020404" pitchFamily="49" charset="0"/>
+              </a:rPr>
+              <a:t>&gt; </a:t>
+            </a:r>
+            <a:r>
+              <a:rPr lang="en-US" sz="1400" dirty="0" err="1">
+                <a:latin typeface="Courier New" panose="02070309020205020404" pitchFamily="49" charset="0"/>
+                <a:cs typeface="Courier New" panose="02070309020205020404" pitchFamily="49" charset="0"/>
+              </a:rPr>
+              <a:t>iris$PW.O</a:t>
+            </a:r>
+            <a:r>
+              <a:rPr lang="en-US" sz="1400" dirty="0">
+                <a:latin typeface="Courier New" panose="02070309020205020404" pitchFamily="49" charset="0"/>
+                <a:cs typeface="Courier New" panose="02070309020205020404" pitchFamily="49" charset="0"/>
+              </a:rPr>
+              <a:t> &lt;- cut(iris$Petal.Width,3</a:t>
+            </a:r>
+            <a:r>
+              <a:rPr lang="en-US" sz="1400" dirty="0" smtClean="0">
+                <a:latin typeface="Courier New" panose="02070309020205020404" pitchFamily="49" charset="0"/>
+                <a:cs typeface="Courier New" panose="02070309020205020404" pitchFamily="49" charset="0"/>
+              </a:rPr>
+              <a:t>)</a:t>
+            </a:r>
+            <a:endParaRPr lang="en-US" sz="1400" dirty="0">
+              <a:latin typeface="Courier New" panose="02070309020205020404" pitchFamily="49" charset="0"/>
+              <a:cs typeface="Courier New" panose="02070309020205020404" pitchFamily="49" charset="0"/>
+            </a:endParaRPr>
+          </a:p>
+        </p:txBody>
+      </p:sp>
+      <p:sp>
+        <p:nvSpPr>
+          <p:cNvPr id="14" name="TextBox 13"/>
+          <p:cNvSpPr txBox="1"/>
+          <p:nvPr/>
+        </p:nvSpPr>
+        <p:spPr>
+          <a:xfrm>
+            <a:off x="301336" y="2554505"/>
+            <a:ext cx="11388437" cy="369332"/>
+          </a:xfrm>
+          <a:prstGeom prst="rect">
+            <a:avLst/>
+          </a:prstGeom>
+          <a:noFill/>
+        </p:spPr>
+        <p:txBody>
+          <a:bodyPr wrap="square" rtlCol="0">
+            <a:spAutoFit/>
+          </a:bodyPr>
+          <a:lstStyle/>
+          <a:p>
+            <a:pPr marL="285750" indent="-285750">
+              <a:buFont typeface="Arial" panose="020B0604020202020204" pitchFamily="34" charset="0"/>
+              <a:buChar char="•"/>
+            </a:pPr>
+            <a:r>
+              <a:rPr lang="en-US" dirty="0" smtClean="0"/>
+              <a:t>We can Now regress Petal Length on this ordinal variable, and investigate the results.</a:t>
+            </a:r>
+          </a:p>
+        </p:txBody>
+      </p:sp>
+      <p:sp>
+        <p:nvSpPr>
+          <p:cNvPr id="15" name="TextBox 14"/>
+          <p:cNvSpPr txBox="1"/>
+          <p:nvPr/>
+        </p:nvSpPr>
+        <p:spPr>
+          <a:xfrm>
+            <a:off x="535147" y="2923837"/>
+            <a:ext cx="8170854" cy="1384995"/>
+          </a:xfrm>
+          <a:prstGeom prst="rect">
+            <a:avLst/>
+          </a:prstGeom>
+          <a:noFill/>
+          <a:ln>
+            <a:solidFill>
+              <a:schemeClr val="tx1"/>
+            </a:solidFill>
+          </a:ln>
+        </p:spPr>
+        <p:txBody>
+          <a:bodyPr wrap="square" rtlCol="0">
+            <a:spAutoFit/>
+          </a:bodyPr>
+          <a:lstStyle/>
+          <a:p>
+            <a:r>
+              <a:rPr lang="en-US" sz="1400" b="1" dirty="0" smtClean="0">
+                <a:latin typeface="Courier New" panose="02070309020205020404" pitchFamily="49" charset="0"/>
+                <a:cs typeface="Courier New" panose="02070309020205020404" pitchFamily="49" charset="0"/>
+              </a:rPr>
+              <a:t>R</a:t>
+            </a:r>
+            <a:r>
+              <a:rPr lang="en-US" sz="1400" b="1" dirty="0" smtClean="0">
+                <a:latin typeface="Courier New" panose="02070309020205020404" pitchFamily="49" charset="0"/>
+                <a:cs typeface="Courier New" panose="02070309020205020404" pitchFamily="49" charset="0"/>
+              </a:rPr>
+              <a:t>&gt; </a:t>
+            </a:r>
+            <a:r>
+              <a:rPr lang="en-US" sz="1400" dirty="0" err="1" smtClean="0">
+                <a:latin typeface="Courier New" panose="02070309020205020404" pitchFamily="49" charset="0"/>
+                <a:cs typeface="Courier New" panose="02070309020205020404" pitchFamily="49" charset="0"/>
+              </a:rPr>
+              <a:t>iris.ordinal.form</a:t>
+            </a:r>
+            <a:r>
+              <a:rPr lang="en-US" sz="1400" dirty="0" smtClean="0">
+                <a:latin typeface="Courier New" panose="02070309020205020404" pitchFamily="49" charset="0"/>
+                <a:cs typeface="Courier New" panose="02070309020205020404" pitchFamily="49" charset="0"/>
+              </a:rPr>
+              <a:t> &lt;- formula(</a:t>
+            </a:r>
+            <a:r>
+              <a:rPr lang="en-US" sz="1400" dirty="0" err="1" smtClean="0">
+                <a:latin typeface="Courier New" panose="02070309020205020404" pitchFamily="49" charset="0"/>
+                <a:cs typeface="Courier New" panose="02070309020205020404" pitchFamily="49" charset="0"/>
+              </a:rPr>
+              <a:t>Petal.Length</a:t>
+            </a:r>
+            <a:r>
+              <a:rPr lang="en-US" sz="1400" dirty="0" smtClean="0">
+                <a:latin typeface="Courier New" panose="02070309020205020404" pitchFamily="49" charset="0"/>
+                <a:cs typeface="Courier New" panose="02070309020205020404" pitchFamily="49" charset="0"/>
+              </a:rPr>
+              <a:t> ~ ordered(PW.O), </a:t>
+            </a:r>
+          </a:p>
+          <a:p>
+            <a:r>
+              <a:rPr lang="en-US" sz="1400" dirty="0">
+                <a:latin typeface="Courier New" panose="02070309020205020404" pitchFamily="49" charset="0"/>
+                <a:cs typeface="Courier New" panose="02070309020205020404" pitchFamily="49" charset="0"/>
+              </a:rPr>
+              <a:t>                                                 levels = c(“(0.0976,0.9</a:t>
+            </a:r>
+            <a:r>
+              <a:rPr lang="en-US" sz="1400" dirty="0" smtClean="0">
+                <a:latin typeface="Courier New" panose="02070309020205020404" pitchFamily="49" charset="0"/>
+                <a:cs typeface="Courier New" panose="02070309020205020404" pitchFamily="49" charset="0"/>
+              </a:rPr>
+              <a:t>]”,</a:t>
+            </a:r>
+          </a:p>
+          <a:p>
+            <a:r>
+              <a:rPr lang="en-US" sz="1400" dirty="0">
+                <a:latin typeface="Courier New" panose="02070309020205020404" pitchFamily="49" charset="0"/>
+                <a:cs typeface="Courier New" panose="02070309020205020404" pitchFamily="49" charset="0"/>
+              </a:rPr>
+              <a:t>	</a:t>
+            </a:r>
+            <a:r>
+              <a:rPr lang="en-US" sz="1400" dirty="0" smtClean="0">
+                <a:latin typeface="Courier New" panose="02070309020205020404" pitchFamily="49" charset="0"/>
+                <a:cs typeface="Courier New" panose="02070309020205020404" pitchFamily="49" charset="0"/>
+              </a:rPr>
+              <a:t>					         “(</a:t>
+            </a:r>
+            <a:r>
+              <a:rPr lang="en-US" sz="1400" dirty="0">
+                <a:latin typeface="Courier New" panose="02070309020205020404" pitchFamily="49" charset="0"/>
+                <a:cs typeface="Courier New" panose="02070309020205020404" pitchFamily="49" charset="0"/>
+              </a:rPr>
+              <a:t>0.9,1.7</a:t>
+            </a:r>
+            <a:r>
+              <a:rPr lang="en-US" sz="1400" dirty="0" smtClean="0">
+                <a:latin typeface="Courier New" panose="02070309020205020404" pitchFamily="49" charset="0"/>
+                <a:cs typeface="Courier New" panose="02070309020205020404" pitchFamily="49" charset="0"/>
+              </a:rPr>
+              <a:t>]”, </a:t>
+            </a:r>
+          </a:p>
+          <a:p>
+            <a:r>
+              <a:rPr lang="en-US" sz="1400" dirty="0">
+                <a:latin typeface="Courier New" panose="02070309020205020404" pitchFamily="49" charset="0"/>
+                <a:cs typeface="Courier New" panose="02070309020205020404" pitchFamily="49" charset="0"/>
+              </a:rPr>
+              <a:t>	</a:t>
+            </a:r>
+            <a:r>
+              <a:rPr lang="en-US" sz="1400" dirty="0" smtClean="0">
+                <a:latin typeface="Courier New" panose="02070309020205020404" pitchFamily="49" charset="0"/>
+                <a:cs typeface="Courier New" panose="02070309020205020404" pitchFamily="49" charset="0"/>
+              </a:rPr>
+              <a:t>						“(</a:t>
+            </a:r>
+            <a:r>
+              <a:rPr lang="en-US" sz="1400" dirty="0">
+                <a:latin typeface="Courier New" panose="02070309020205020404" pitchFamily="49" charset="0"/>
+                <a:cs typeface="Courier New" panose="02070309020205020404" pitchFamily="49" charset="0"/>
+              </a:rPr>
+              <a:t>1.7,2.5</a:t>
+            </a:r>
+            <a:r>
+              <a:rPr lang="en-US" sz="1400" dirty="0" smtClean="0">
+                <a:latin typeface="Courier New" panose="02070309020205020404" pitchFamily="49" charset="0"/>
+                <a:cs typeface="Courier New" panose="02070309020205020404" pitchFamily="49" charset="0"/>
+              </a:rPr>
+              <a:t>]”</a:t>
+            </a:r>
+            <a:r>
+              <a:rPr lang="en-US" sz="1400" dirty="0" smtClean="0">
+                <a:latin typeface="Courier New" panose="02070309020205020404" pitchFamily="49" charset="0"/>
+                <a:cs typeface="Courier New" panose="02070309020205020404" pitchFamily="49" charset="0"/>
+              </a:rPr>
+              <a:t>));</a:t>
+            </a:r>
+          </a:p>
+          <a:p>
+            <a:r>
+              <a:rPr lang="en-US" sz="1400" b="1" dirty="0" smtClean="0">
+                <a:latin typeface="Courier New" panose="02070309020205020404" pitchFamily="49" charset="0"/>
+                <a:cs typeface="Courier New" panose="02070309020205020404" pitchFamily="49" charset="0"/>
+              </a:rPr>
+              <a:t>R&gt; </a:t>
+            </a:r>
+            <a:r>
+              <a:rPr lang="en-US" sz="1400" dirty="0" smtClean="0">
+                <a:latin typeface="Courier New" panose="02070309020205020404" pitchFamily="49" charset="0"/>
+                <a:cs typeface="Courier New" panose="02070309020205020404" pitchFamily="49" charset="0"/>
+              </a:rPr>
+              <a:t>iris.ordinal.mod &lt;- </a:t>
+            </a:r>
+            <a:r>
+              <a:rPr lang="en-US" sz="1400" dirty="0" err="1" smtClean="0">
+                <a:latin typeface="Courier New" panose="02070309020205020404" pitchFamily="49" charset="0"/>
+                <a:cs typeface="Courier New" panose="02070309020205020404" pitchFamily="49" charset="0"/>
+              </a:rPr>
+              <a:t>glm</a:t>
+            </a:r>
+            <a:r>
+              <a:rPr lang="en-US" sz="1400" dirty="0" smtClean="0">
+                <a:latin typeface="Courier New" panose="02070309020205020404" pitchFamily="49" charset="0"/>
+                <a:cs typeface="Courier New" panose="02070309020205020404" pitchFamily="49" charset="0"/>
+              </a:rPr>
+              <a:t>(</a:t>
+            </a:r>
+            <a:r>
+              <a:rPr lang="en-US" sz="1400" dirty="0" err="1" smtClean="0">
+                <a:latin typeface="Courier New" panose="02070309020205020404" pitchFamily="49" charset="0"/>
+                <a:cs typeface="Courier New" panose="02070309020205020404" pitchFamily="49" charset="0"/>
+              </a:rPr>
+              <a:t>iris.ordinal.form</a:t>
+            </a:r>
+            <a:r>
+              <a:rPr lang="en-US" sz="1400" dirty="0" smtClean="0">
+                <a:latin typeface="Courier New" panose="02070309020205020404" pitchFamily="49" charset="0"/>
+                <a:cs typeface="Courier New" panose="02070309020205020404" pitchFamily="49" charset="0"/>
+              </a:rPr>
+              <a:t>);</a:t>
+            </a:r>
+          </a:p>
+          <a:p>
+            <a:r>
+              <a:rPr lang="en-US" sz="1400" b="1" dirty="0" smtClean="0">
+                <a:latin typeface="Courier New" panose="02070309020205020404" pitchFamily="49" charset="0"/>
+                <a:cs typeface="Courier New" panose="02070309020205020404" pitchFamily="49" charset="0"/>
+              </a:rPr>
+              <a:t>R&gt; </a:t>
+            </a:r>
+            <a:r>
+              <a:rPr lang="en-US" sz="1400" dirty="0" smtClean="0">
+                <a:latin typeface="Courier New" panose="02070309020205020404" pitchFamily="49" charset="0"/>
+                <a:cs typeface="Courier New" panose="02070309020205020404" pitchFamily="49" charset="0"/>
+              </a:rPr>
+              <a:t>summary(iris.ordinal.mod); </a:t>
+            </a:r>
+            <a:r>
+              <a:rPr lang="en-US" sz="1400" dirty="0" smtClean="0">
+                <a:latin typeface="Courier New" panose="02070309020205020404" pitchFamily="49" charset="0"/>
+                <a:cs typeface="Courier New" panose="02070309020205020404" pitchFamily="49" charset="0"/>
+              </a:rPr>
+              <a:t> </a:t>
+            </a:r>
+            <a:endParaRPr lang="en-US" sz="1400" dirty="0">
+              <a:latin typeface="Courier New" panose="02070309020205020404" pitchFamily="49" charset="0"/>
+              <a:cs typeface="Courier New" panose="02070309020205020404" pitchFamily="49" charset="0"/>
+            </a:endParaRPr>
+          </a:p>
+        </p:txBody>
+      </p:sp>
+      <p:cxnSp>
+        <p:nvCxnSpPr>
+          <p:cNvPr id="18" name="Elbow Connector 17"/>
+          <p:cNvCxnSpPr>
+            <a:endCxn id="16" idx="1"/>
+          </p:cNvCxnSpPr>
+          <p:nvPr/>
+        </p:nvCxnSpPr>
+        <p:spPr>
+          <a:xfrm>
+            <a:off x="5060376" y="4308834"/>
+            <a:ext cx="995742" cy="753667"/>
+          </a:xfrm>
+          <a:prstGeom prst="bentConnector3">
+            <a:avLst>
+              <a:gd name="adj1" fmla="val 50000"/>
+            </a:avLst>
+          </a:prstGeom>
+          <a:ln>
+            <a:solidFill>
+              <a:schemeClr val="bg1">
+                <a:lumMod val="10000"/>
+              </a:schemeClr>
+            </a:solidFill>
+            <a:tailEnd type="triangle"/>
+          </a:ln>
+        </p:spPr>
+        <p:style>
+          <a:lnRef idx="1">
+            <a:schemeClr val="accent1"/>
+          </a:lnRef>
+          <a:fillRef idx="0">
+            <a:schemeClr val="accent1"/>
+          </a:fillRef>
+          <a:effectRef idx="0">
+            <a:schemeClr val="accent1"/>
+          </a:effectRef>
+          <a:fontRef idx="minor">
+            <a:schemeClr val="tx1"/>
+          </a:fontRef>
+        </p:style>
+      </p:cxnSp>
+      <p:sp>
+        <p:nvSpPr>
+          <p:cNvPr id="19" name="TextBox 18"/>
+          <p:cNvSpPr txBox="1"/>
+          <p:nvPr/>
+        </p:nvSpPr>
+        <p:spPr>
+          <a:xfrm>
+            <a:off x="9151743" y="2475861"/>
+            <a:ext cx="2704285" cy="1200329"/>
+          </a:xfrm>
+          <a:prstGeom prst="rect">
+            <a:avLst/>
+          </a:prstGeom>
+          <a:noFill/>
+        </p:spPr>
+        <p:txBody>
+          <a:bodyPr wrap="square" rtlCol="0">
+            <a:spAutoFit/>
+          </a:bodyPr>
+          <a:lstStyle/>
+          <a:p>
+            <a:r>
+              <a:rPr lang="en-US" dirty="0" smtClean="0"/>
+              <a:t>“.L” is Linear “.Q” quadratic, “.C” cubic, “^4” and so on, fourth and higher ordered trends</a:t>
+            </a:r>
+            <a:endParaRPr lang="en-US" dirty="0"/>
+          </a:p>
+        </p:txBody>
+      </p:sp>
+      <p:sp>
+        <p:nvSpPr>
+          <p:cNvPr id="20" name="Rectangle 19"/>
+          <p:cNvSpPr/>
+          <p:nvPr/>
+        </p:nvSpPr>
+        <p:spPr>
+          <a:xfrm>
+            <a:off x="20782" y="4357006"/>
+            <a:ext cx="5579918" cy="1200329"/>
+          </a:xfrm>
+          <a:prstGeom prst="rect">
+            <a:avLst/>
+          </a:prstGeom>
+        </p:spPr>
+        <p:txBody>
+          <a:bodyPr wrap="square">
+            <a:spAutoFit/>
+          </a:bodyPr>
+          <a:lstStyle/>
+          <a:p>
+            <a:r>
+              <a:rPr lang="en-US" dirty="0" smtClean="0"/>
+              <a:t>Interpretation of </a:t>
+            </a:r>
+            <a:r>
+              <a:rPr lang="en-US" dirty="0"/>
+              <a:t>Estimates is hard in this case, A significant result really only indicates that there is statistical evidence of a </a:t>
+            </a:r>
+            <a:r>
+              <a:rPr lang="en-US" dirty="0" smtClean="0"/>
+              <a:t>Linear/Quadratic/Cubic/etc… </a:t>
+            </a:r>
+            <a:r>
+              <a:rPr lang="en-US" dirty="0"/>
+              <a:t>trend by level.</a:t>
             </a:r>
             <a:endParaRPr lang="en-US" dirty="0"/>
           </a:p>
@@ -23597,6 +24425,13 @@
   <p:clrMapOvr>
     <a:masterClrMapping/>
   </p:clrMapOvr>
+  <p:timing>
+    <p:tnLst>
+      <p:par>
+        <p:cTn id="1" dur="indefinite" restart="never" nodeType="tmRoot"/>
+      </p:par>
+    </p:tnLst>
+  </p:timing>
 </p:sld>
 </file>
 
@@ -23947,6 +24782,13 @@
   <p:clrMapOvr>
     <a:masterClrMapping/>
   </p:clrMapOvr>
+  <p:timing>
+    <p:tnLst>
+      <p:par>
+        <p:cTn id="1" dur="indefinite" restart="never" nodeType="tmRoot"/>
+      </p:par>
+    </p:tnLst>
+  </p:timing>
 </p:sld>
 </file>
 
@@ -24276,6 +25118,13 @@
   <p:clrMapOvr>
     <a:masterClrMapping/>
   </p:clrMapOvr>
+  <p:timing>
+    <p:tnLst>
+      <p:par>
+        <p:cTn id="1" dur="indefinite" restart="never" nodeType="tmRoot"/>
+      </p:par>
+    </p:tnLst>
+  </p:timing>
 </p:sld>
 </file>
 
@@ -25143,6 +25992,13 @@
   <p:clrMapOvr>
     <a:masterClrMapping/>
   </p:clrMapOvr>
+  <p:timing>
+    <p:tnLst>
+      <p:par>
+        <p:cTn id="1" dur="indefinite" restart="never" nodeType="tmRoot"/>
+      </p:par>
+    </p:tnLst>
+  </p:timing>
 </p:sld>
 </file>
 
@@ -28721,7 +29577,7 @@
         <p:spPr>
           <a:xfrm>
             <a:off x="519953" y="869576"/>
-            <a:ext cx="11107271" cy="5601533"/>
+            <a:ext cx="11107271" cy="6709529"/>
           </a:xfrm>
           <a:prstGeom prst="rect">
             <a:avLst/>
@@ -28966,8 +29822,78 @@
                 <a:latin typeface="Times New Roman" panose="02020603050405020304" pitchFamily="18" charset="0"/>
                 <a:cs typeface="Times New Roman" panose="02020603050405020304" pitchFamily="18" charset="0"/>
               </a:rPr>
-              <a:t> with three levels: low (less than 18.936), medium (between 18.936 and 20.708), and high (greater than 20.708), and regress Fertility on this variable alone, using high as the reference.  What is the interpretation of the value -10.495 in the Estimate Column? </a:t>
-            </a:r>
+              <a:t> with three levels: low (less than 18.936), medium (between 18.936 and 20.708), and high (greater than 20.708), and regress Fertility on this variable </a:t>
+            </a:r>
+            <a:r>
+              <a:rPr lang="en-US" dirty="0" smtClean="0">
+                <a:latin typeface="Times New Roman" panose="02020603050405020304" pitchFamily="18" charset="0"/>
+                <a:cs typeface="Times New Roman" panose="02020603050405020304" pitchFamily="18" charset="0"/>
+              </a:rPr>
+              <a:t>alone.  Does there appear to be either a linear or quadratic trend of association between Infant Mortality and Fertility?</a:t>
+            </a:r>
+          </a:p>
+          <a:p>
+            <a:pPr marL="1371600" lvl="2" indent="-457200">
+              <a:buFont typeface="+mj-lt"/>
+              <a:buAutoNum type="arabicPeriod"/>
+            </a:pPr>
+            <a:r>
+              <a:rPr lang="en-US" dirty="0" smtClean="0">
+                <a:latin typeface="Times New Roman" panose="02020603050405020304" pitchFamily="18" charset="0"/>
+                <a:cs typeface="Times New Roman" panose="02020603050405020304" pitchFamily="18" charset="0"/>
+              </a:rPr>
+              <a:t>Repeat 5 using 4 categories for Infant Mortality, </a:t>
+            </a:r>
+          </a:p>
+          <a:p>
+            <a:pPr marL="1371600" lvl="2" indent="-457200">
+              <a:buFont typeface="+mj-lt"/>
+              <a:buAutoNum type="arabicPeriod"/>
+            </a:pPr>
+            <a:r>
+              <a:rPr lang="en-US" dirty="0" smtClean="0">
+                <a:latin typeface="Times New Roman" panose="02020603050405020304" pitchFamily="18" charset="0"/>
+                <a:cs typeface="Times New Roman" panose="02020603050405020304" pitchFamily="18" charset="0"/>
+              </a:rPr>
+              <a:t>5 Categories for Infant Mortality</a:t>
+            </a:r>
+          </a:p>
+          <a:p>
+            <a:pPr marL="1371600" lvl="2" indent="-457200">
+              <a:buFont typeface="+mj-lt"/>
+              <a:buAutoNum type="arabicPeriod"/>
+            </a:pPr>
+            <a:r>
+              <a:rPr lang="en-US" dirty="0" smtClean="0">
+                <a:latin typeface="Times New Roman" panose="02020603050405020304" pitchFamily="18" charset="0"/>
+                <a:cs typeface="Times New Roman" panose="02020603050405020304" pitchFamily="18" charset="0"/>
+              </a:rPr>
+              <a:t>Regress Fertility on Infant Mortalit</a:t>
+            </a:r>
+            <a:r>
+              <a:rPr lang="en-US" dirty="0" smtClean="0">
+                <a:latin typeface="Times New Roman" panose="02020603050405020304" pitchFamily="18" charset="0"/>
+                <a:cs typeface="Times New Roman" panose="02020603050405020304" pitchFamily="18" charset="0"/>
+              </a:rPr>
+              <a:t>y and Infant Mortality squared</a:t>
+            </a:r>
+          </a:p>
+          <a:p>
+            <a:pPr marL="1828800" lvl="3" indent="-457200">
+              <a:buFont typeface="+mj-lt"/>
+              <a:buAutoNum type="arabicPeriod"/>
+            </a:pPr>
+            <a:r>
+              <a:rPr lang="en-US" dirty="0" smtClean="0">
+                <a:latin typeface="Times New Roman" panose="02020603050405020304" pitchFamily="18" charset="0"/>
+                <a:cs typeface="Times New Roman" panose="02020603050405020304" pitchFamily="18" charset="0"/>
+              </a:rPr>
+              <a:t>What do these results indicate about categorizing continuous variables?</a:t>
+            </a:r>
+            <a:endParaRPr lang="en-US" dirty="0" smtClean="0">
+              <a:latin typeface="Times New Roman" panose="02020603050405020304" pitchFamily="18" charset="0"/>
+              <a:cs typeface="Times New Roman" panose="02020603050405020304" pitchFamily="18" charset="0"/>
+            </a:endParaRPr>
           </a:p>
           <a:p>
             <a:pPr marL="914400" lvl="1" indent="-457200">
@@ -29275,6 +30201,250 @@
           </a:p>
         </p:txBody>
       </p:sp>
+      <mc:AlternateContent xmlns:mc="http://schemas.openxmlformats.org/markup-compatibility/2006">
+        <mc:Choice xmlns:a14="http://schemas.microsoft.com/office/drawing/2010/main" Requires="a14">
+          <p:sp>
+            <p:nvSpPr>
+              <p:cNvPr id="3" name="TextBox 2"/>
+              <p:cNvSpPr txBox="1"/>
+              <p:nvPr/>
+            </p:nvSpPr>
+            <p:spPr>
+              <a:xfrm>
+                <a:off x="716973" y="852055"/>
+                <a:ext cx="11035145" cy="5632311"/>
+              </a:xfrm>
+              <a:prstGeom prst="rect">
+                <a:avLst/>
+              </a:prstGeom>
+              <a:noFill/>
+            </p:spPr>
+            <p:txBody>
+              <a:bodyPr wrap="square" rtlCol="0">
+                <a:spAutoFit/>
+              </a:bodyPr>
+              <a:lstStyle/>
+              <a:p>
+                <a:pPr marL="285750" indent="-285750">
+                  <a:buFont typeface="Arial" panose="020B0604020202020204" pitchFamily="34" charset="0"/>
+                  <a:buChar char="•"/>
+                </a:pPr>
+                <a:r>
+                  <a:rPr lang="en-US" dirty="0" smtClean="0"/>
+                  <a:t>When I talked about the linear model previously, I specifically did not reveal all of the details, but I did mention that all that we have done previously could be done using the ‘lm()’ function instead of the ‘</a:t>
+                </a:r>
+                <a:r>
+                  <a:rPr lang="en-US" dirty="0" err="1" smtClean="0"/>
+                  <a:t>glm</a:t>
+                </a:r>
+                <a:r>
+                  <a:rPr lang="en-US" dirty="0" smtClean="0"/>
+                  <a:t>()’ function. </a:t>
+                </a:r>
+              </a:p>
+              <a:p>
+                <a:pPr marL="285750" indent="-285750">
+                  <a:buFont typeface="Arial" panose="020B0604020202020204" pitchFamily="34" charset="0"/>
+                  <a:buChar char="•"/>
+                </a:pPr>
+                <a:r>
+                  <a:rPr lang="en-US" dirty="0" smtClean="0"/>
+                  <a:t>The ‘g’ stands for generalized, of which we have so far been using only a very specific type. </a:t>
+                </a:r>
+              </a:p>
+              <a:p>
+                <a:pPr marL="285750" indent="-285750">
+                  <a:buFont typeface="Arial" panose="020B0604020202020204" pitchFamily="34" charset="0"/>
+                  <a:buChar char="•"/>
+                </a:pPr>
+                <a:endParaRPr lang="en-US" dirty="0"/>
+              </a:p>
+              <a:p>
+                <a:pPr marL="285750" indent="-285750">
+                  <a:buFont typeface="Arial" panose="020B0604020202020204" pitchFamily="34" charset="0"/>
+                  <a:buChar char="•"/>
+                </a:pPr>
+                <a:r>
+                  <a:rPr lang="en-US" dirty="0" smtClean="0"/>
+                  <a:t>In the generalized linear model we relate the parameters of the distribution of an outcome variable to some pre specified functions of the explanatory variables estimating effects by minimizing the residuals (or distance to the predicted value). – You may have heard this called Ordinary Least Squares or OLS regression (We pick the model which produces the Least Squared Error between the data and the predictions) </a:t>
+                </a:r>
+              </a:p>
+              <a:p>
+                <a:pPr marL="285750" indent="-285750">
+                  <a:buFont typeface="Arial" panose="020B0604020202020204" pitchFamily="34" charset="0"/>
+                  <a:buChar char="•"/>
+                </a:pPr>
+                <a:r>
+                  <a:rPr lang="en-US" dirty="0" smtClean="0"/>
+                  <a:t>In the field of statistics we are generally concerned with producing estimates of distributional and model parameters which produce the highest likelihood for a given dataset, it just so happens that in the case of one very particular kind of model the OLS fit is the Maximum Likelihood or MLE fit.</a:t>
+                </a:r>
+              </a:p>
+              <a:p>
+                <a:pPr marL="285750" indent="-285750">
+                  <a:buFont typeface="Arial" panose="020B0604020202020204" pitchFamily="34" charset="0"/>
+                  <a:buChar char="•"/>
+                </a:pPr>
+                <a:endParaRPr lang="en-US" dirty="0"/>
+              </a:p>
+              <a:p>
+                <a:pPr marL="285750" indent="-285750">
+                  <a:buFont typeface="Arial" panose="020B0604020202020204" pitchFamily="34" charset="0"/>
+                  <a:buChar char="•"/>
+                </a:pPr>
+                <a:r>
+                  <a:rPr lang="en-US" dirty="0" smtClean="0"/>
+                  <a:t>In a Generalized Linear Model we define three key components. </a:t>
+                </a:r>
+              </a:p>
+              <a:p>
+                <a:pPr marL="800100" lvl="1" indent="-342900">
+                  <a:buFont typeface="+mj-lt"/>
+                  <a:buAutoNum type="arabicPeriod"/>
+                </a:pPr>
+                <a:r>
+                  <a:rPr lang="en-US" dirty="0" smtClean="0"/>
+                  <a:t>The distribution of the outcome variable (which is typically a distribution from the exponential family of distributions – this makes the math work out nicely) with parameters </a:t>
+                </a:r>
+                <a14:m>
+                  <m:oMath xmlns:m="http://schemas.openxmlformats.org/officeDocument/2006/math">
+                    <m:r>
+                      <a:rPr lang="en-US" b="0" i="1" smtClean="0">
+                        <a:latin typeface="Cambria Math" panose="02040503050406030204" pitchFamily="18" charset="0"/>
+                      </a:rPr>
+                      <m:t>𝜃</m:t>
+                    </m:r>
+                  </m:oMath>
+                </a14:m>
+                <a:r>
+                  <a:rPr lang="en-US" dirty="0" smtClean="0"/>
+                  <a:t>. </a:t>
+                </a:r>
+              </a:p>
+              <a:p>
+                <a:pPr marL="800100" lvl="1" indent="-342900">
+                  <a:buFont typeface="+mj-lt"/>
+                  <a:buAutoNum type="arabicPeriod"/>
+                </a:pPr>
+                <a:r>
+                  <a:rPr lang="en-US" dirty="0" smtClean="0"/>
+                  <a:t>A systematic relationship (function) of the predictors/covariates that is linear in the effects to the linear predictor (a value, usually </a:t>
+                </a:r>
+                <a14:m>
+                  <m:oMath xmlns:m="http://schemas.openxmlformats.org/officeDocument/2006/math">
+                    <m:r>
+                      <a:rPr lang="en-US" b="0" i="1" smtClean="0">
+                        <a:latin typeface="Cambria Math" panose="02040503050406030204" pitchFamily="18" charset="0"/>
+                      </a:rPr>
+                      <m:t>𝜂</m:t>
+                    </m:r>
+                  </m:oMath>
+                </a14:m>
+                <a:r>
+                  <a:rPr lang="en-US" dirty="0" smtClean="0"/>
+                  <a:t>).</a:t>
+                </a:r>
+              </a:p>
+              <a:p>
+                <a:pPr marL="800100" lvl="1" indent="-342900">
+                  <a:buFont typeface="+mj-lt"/>
+                  <a:buAutoNum type="arabicPeriod"/>
+                </a:pPr>
+                <a:r>
+                  <a:rPr lang="en-US" dirty="0" smtClean="0"/>
+                  <a:t>A link function (generally denoted </a:t>
+                </a:r>
+                <a14:m>
+                  <m:oMath xmlns:m="http://schemas.openxmlformats.org/officeDocument/2006/math">
+                    <m:r>
+                      <a:rPr lang="en-US" b="0" i="1" smtClean="0">
+                        <a:latin typeface="Cambria Math" panose="02040503050406030204" pitchFamily="18" charset="0"/>
+                      </a:rPr>
+                      <m:t>𝑔</m:t>
+                    </m:r>
+                  </m:oMath>
+                </a14:m>
+                <a:r>
+                  <a:rPr lang="en-US" dirty="0" smtClean="0"/>
+                  <a:t>) which relates the linear predictor from 2 (</a:t>
+                </a:r>
+                <a14:m>
+                  <m:oMath xmlns:m="http://schemas.openxmlformats.org/officeDocument/2006/math">
+                    <m:r>
+                      <a:rPr lang="en-US" b="0" i="1" smtClean="0">
+                        <a:latin typeface="Cambria Math" panose="02040503050406030204" pitchFamily="18" charset="0"/>
+                      </a:rPr>
+                      <m:t>𝜂</m:t>
+                    </m:r>
+                  </m:oMath>
+                </a14:m>
+                <a:r>
+                  <a:rPr lang="en-US" dirty="0" smtClean="0"/>
+                  <a:t>) to the outcome distribution parameter(s) from 1 (</a:t>
+                </a:r>
+                <a14:m>
+                  <m:oMath xmlns:m="http://schemas.openxmlformats.org/officeDocument/2006/math">
+                    <m:r>
+                      <a:rPr lang="en-US" b="0" i="1" smtClean="0">
+                        <a:latin typeface="Cambria Math" panose="02040503050406030204" pitchFamily="18" charset="0"/>
+                      </a:rPr>
+                      <m:t>𝜃</m:t>
+                    </m:r>
+                  </m:oMath>
+                </a14:m>
+                <a:r>
+                  <a:rPr lang="en-US" dirty="0" smtClean="0"/>
+                  <a:t>)</a:t>
+                </a:r>
+              </a:p>
+              <a:p>
+                <a:pPr marL="800100" lvl="1" indent="-342900">
+                  <a:buFont typeface="+mj-lt"/>
+                  <a:buAutoNum type="arabicPeriod"/>
+                </a:pPr>
+                <a:endParaRPr lang="en-US" dirty="0" smtClean="0"/>
+              </a:p>
+            </p:txBody>
+          </p:sp>
+        </mc:Choice>
+        <mc:Fallback>
+          <p:sp>
+            <p:nvSpPr>
+              <p:cNvPr id="3" name="TextBox 2"/>
+              <p:cNvSpPr txBox="1">
+                <a:spLocks noRot="1" noChangeAspect="1" noMove="1" noResize="1" noEditPoints="1" noAdjustHandles="1" noChangeArrowheads="1" noChangeShapeType="1" noTextEdit="1"/>
+              </p:cNvSpPr>
+              <p:nvPr/>
+            </p:nvSpPr>
+            <p:spPr>
+              <a:xfrm>
+                <a:off x="716973" y="852055"/>
+                <a:ext cx="11035145" cy="5632311"/>
+              </a:xfrm>
+              <a:prstGeom prst="rect">
+                <a:avLst/>
+              </a:prstGeom>
+              <a:blipFill>
+                <a:blip r:embed="rId2"/>
+                <a:stretch>
+                  <a:fillRect l="-387" t="-649"/>
+                </a:stretch>
+              </a:blipFill>
+            </p:spPr>
+            <p:txBody>
+              <a:bodyPr/>
+              <a:lstStyle/>
+              <a:p>
+                <a:r>
+                  <a:rPr lang="en-US">
+                    <a:noFill/>
+                  </a:rPr>
+                  <a:t> </a:t>
+                </a:r>
+              </a:p>
+            </p:txBody>
+          </p:sp>
+        </mc:Fallback>
+      </mc:AlternateContent>
     </p:spTree>
     <p:extLst>
       <p:ext uri="{BB962C8B-B14F-4D97-AF65-F5344CB8AC3E}">
@@ -29429,14 +30599,7 @@
                 <a:latin typeface="Times New Roman" panose="02020603050405020304" pitchFamily="18" charset="0"/>
                 <a:cs typeface="Times New Roman" panose="02020603050405020304" pitchFamily="18" charset="0"/>
               </a:rPr>
-              <a:t>lme4 (Linear Mixed-Effects models) </a:t>
-            </a:r>
-            <a:r>
-              <a:rPr lang="en-US" sz="1400" b="1" dirty="0" smtClean="0">
-                <a:latin typeface="Times New Roman" panose="02020603050405020304" pitchFamily="18" charset="0"/>
-                <a:cs typeface="Times New Roman" panose="02020603050405020304" pitchFamily="18" charset="0"/>
-              </a:rPr>
-              <a:t>package</a:t>
+              <a:t>lme4 (Linear Mixed-Effects models) package</a:t>
             </a:r>
             <a:r>
               <a:rPr lang="en-US" sz="1400" dirty="0" smtClean="0">
@@ -29805,6 +30968,13 @@
   <p:clrMapOvr>
     <a:masterClrMapping/>
   </p:clrMapOvr>
+  <p:timing>
+    <p:tnLst>
+      <p:par>
+        <p:cTn id="1" dur="indefinite" restart="never" nodeType="tmRoot"/>
+      </p:par>
+    </p:tnLst>
+  </p:timing>
 </p:sld>
 </file>
 
@@ -30273,6 +31443,13 @@
   <p:clrMapOvr>
     <a:masterClrMapping/>
   </p:clrMapOvr>
+  <p:timing>
+    <p:tnLst>
+      <p:par>
+        <p:cTn id="1" dur="indefinite" restart="never" nodeType="tmRoot"/>
+      </p:par>
+    </p:tnLst>
+  </p:timing>
 </p:sld>
 </file>
 
@@ -31434,6 +32611,13 @@
   <p:clrMapOvr>
     <a:masterClrMapping/>
   </p:clrMapOvr>
+  <p:timing>
+    <p:tnLst>
+      <p:par>
+        <p:cTn id="1" dur="indefinite" restart="never" nodeType="tmRoot"/>
+      </p:par>
+    </p:tnLst>
+  </p:timing>
 </p:sld>
 </file>
 
@@ -31855,6 +33039,13 @@
   <p:clrMapOvr>
     <a:masterClrMapping/>
   </p:clrMapOvr>
+  <p:timing>
+    <p:tnLst>
+      <p:par>
+        <p:cTn id="1" dur="indefinite" restart="never" nodeType="tmRoot"/>
+      </p:par>
+    </p:tnLst>
+  </p:timing>
 </p:sld>
 </file>
 
@@ -32388,6 +33579,13 @@
   <p:clrMapOvr>
     <a:masterClrMapping/>
   </p:clrMapOvr>
+  <p:timing>
+    <p:tnLst>
+      <p:par>
+        <p:cTn id="1" dur="indefinite" restart="never" nodeType="tmRoot"/>
+      </p:par>
+    </p:tnLst>
+  </p:timing>
 </p:sld>
 </file>
 
@@ -33540,6 +34738,13 @@
   <p:clrMapOvr>
     <a:masterClrMapping/>
   </p:clrMapOvr>
+  <p:timing>
+    <p:tnLst>
+      <p:par>
+        <p:cTn id="1" dur="indefinite" restart="never" nodeType="tmRoot"/>
+      </p:par>
+    </p:tnLst>
+  </p:timing>
 </p:sld>
 </file>
 

</xml_diff>